<commit_message>
Changed naming.  Added Twitter project
</commit_message>
<xml_diff>
--- a/Presentation/AzureFunctions.pptx
+++ b/Presentation/AzureFunctions.pptx
@@ -5,7 +5,7 @@
     <p:sldMasterId id="2147483648" r:id="rId1"/>
   </p:sldMasterIdLst>
   <p:notesMasterIdLst>
-    <p:notesMasterId r:id="rId23"/>
+    <p:notesMasterId r:id="rId24"/>
   </p:notesMasterIdLst>
   <p:sldIdLst>
     <p:sldId id="256" r:id="rId2"/>
@@ -23,12 +23,13 @@
     <p:sldId id="272" r:id="rId14"/>
     <p:sldId id="274" r:id="rId15"/>
     <p:sldId id="275" r:id="rId16"/>
-    <p:sldId id="288" r:id="rId17"/>
-    <p:sldId id="290" r:id="rId18"/>
-    <p:sldId id="276" r:id="rId19"/>
-    <p:sldId id="277" r:id="rId20"/>
-    <p:sldId id="280" r:id="rId21"/>
-    <p:sldId id="289" r:id="rId22"/>
+    <p:sldId id="295" r:id="rId17"/>
+    <p:sldId id="288" r:id="rId18"/>
+    <p:sldId id="290" r:id="rId19"/>
+    <p:sldId id="276" r:id="rId20"/>
+    <p:sldId id="277" r:id="rId21"/>
+    <p:sldId id="280" r:id="rId22"/>
+    <p:sldId id="289" r:id="rId23"/>
   </p:sldIdLst>
   <p:sldSz cx="12192000" cy="6858000"/>
   <p:notesSz cx="6858000" cy="9144000"/>
@@ -652,43 +653,59 @@
           <a:lstStyle/>
           <a:p>
             <a:r>
-              <a:rPr lang="en-US" dirty="0" smtClean="0"/>
-              <a:t>You can try maintain state</a:t>
-            </a:r>
-          </a:p>
-          <a:p>
-            <a:r>
-              <a:rPr lang="en-US" dirty="0" smtClean="0"/>
-              <a:t>We throw away state whenever we want</a:t>
-            </a:r>
-          </a:p>
-          <a:p>
+              <a:rPr lang="en-US" baseline="0" dirty="0" smtClean="0"/>
+              <a:t>Every minute, get </a:t>
+            </a:r>
+            <a:r>
+              <a:rPr lang="en-US" baseline="0" dirty="0" smtClean="0"/>
+              <a:t>tweet and </a:t>
+            </a:r>
+            <a:r>
+              <a:rPr lang="en-US" baseline="0" dirty="0" smtClean="0"/>
+              <a:t>put it on the </a:t>
+            </a:r>
+            <a:r>
+              <a:rPr lang="en-US" baseline="0" dirty="0" smtClean="0"/>
+              <a:t>table (C#)</a:t>
+            </a:r>
+            <a:endParaRPr lang="en-US" baseline="0" dirty="0" smtClean="0"/>
+          </a:p>
+          <a:p>
+            <a:r>
+              <a:rPr lang="en-US" baseline="0" dirty="0" smtClean="0"/>
+              <a:t>Get values from </a:t>
+            </a:r>
+            <a:r>
+              <a:rPr lang="en-US" baseline="0" dirty="0" smtClean="0"/>
+              <a:t>table, analyze it, </a:t>
+            </a:r>
+            <a:r>
+              <a:rPr lang="en-US" baseline="0" dirty="0" smtClean="0"/>
+              <a:t>and put it into a </a:t>
+            </a:r>
+            <a:r>
+              <a:rPr lang="en-US" baseline="0" dirty="0" smtClean="0"/>
+              <a:t>queue (python)</a:t>
+            </a:r>
+            <a:endParaRPr lang="en-US" baseline="0" dirty="0" smtClean="0"/>
+          </a:p>
+          <a:p>
+            <a:r>
+              <a:rPr lang="en-US" baseline="0" dirty="0" smtClean="0"/>
+              <a:t>Get values from </a:t>
+            </a:r>
+            <a:r>
+              <a:rPr lang="en-US" baseline="0" dirty="0" smtClean="0"/>
+              <a:t>queue and notify (node p.57, 115)</a:t>
+            </a:r>
+            <a:endParaRPr lang="en-US" baseline="0" dirty="0" smtClean="0"/>
+          </a:p>
+          <a:p>
+            <a:r>
+              <a:rPr lang="en-US" baseline="0" dirty="0" smtClean="0"/>
+              <a:t> </a:t>
+            </a:r>
             <a:endParaRPr lang="en-US" dirty="0" smtClean="0"/>
-          </a:p>
-          <a:p>
-            <a:r>
-              <a:rPr lang="en-US" dirty="0" smtClean="0"/>
-              <a:t>Pay </a:t>
-            </a:r>
-            <a:r>
-              <a:rPr lang="en-US" dirty="0" smtClean="0"/>
-              <a:t>for function processing</a:t>
-            </a:r>
-          </a:p>
-          <a:p>
-            <a:r>
-              <a:rPr lang="en-US" dirty="0" smtClean="0"/>
-              <a:t>Want to respond immediate (I started)</a:t>
-            </a:r>
-          </a:p>
-          <a:p>
-            <a:r>
-              <a:rPr lang="en-US" dirty="0" smtClean="0"/>
-              <a:t>Inspect for complete (queue)</a:t>
-            </a:r>
-          </a:p>
-          <a:p>
-            <a:endParaRPr lang="en-US" dirty="0"/>
           </a:p>
         </p:txBody>
       </p:sp>
@@ -718,7 +735,7 @@
     </p:spTree>
     <p:extLst>
       <p:ext uri="{BB962C8B-B14F-4D97-AF65-F5344CB8AC3E}">
-        <p14:creationId xmlns:p14="http://schemas.microsoft.com/office/powerpoint/2010/main" val="619906070"/>
+        <p14:creationId xmlns:p14="http://schemas.microsoft.com/office/powerpoint/2010/main" val="46495196"/>
       </p:ext>
     </p:extLst>
   </p:cSld>
@@ -774,6 +791,123 @@
           <a:p>
             <a:r>
               <a:rPr lang="en-US" dirty="0" smtClean="0"/>
+              <a:t>You can try maintain state</a:t>
+            </a:r>
+          </a:p>
+          <a:p>
+            <a:r>
+              <a:rPr lang="en-US" dirty="0" smtClean="0"/>
+              <a:t>We throw away state whenever we want</a:t>
+            </a:r>
+          </a:p>
+          <a:p>
+            <a:endParaRPr lang="en-US" dirty="0" smtClean="0"/>
+          </a:p>
+          <a:p>
+            <a:r>
+              <a:rPr lang="en-US" dirty="0" smtClean="0"/>
+              <a:t>Pay for function processing</a:t>
+            </a:r>
+          </a:p>
+          <a:p>
+            <a:r>
+              <a:rPr lang="en-US" dirty="0" smtClean="0"/>
+              <a:t>Want to respond immediate (I started)</a:t>
+            </a:r>
+          </a:p>
+          <a:p>
+            <a:r>
+              <a:rPr lang="en-US" dirty="0" smtClean="0"/>
+              <a:t>Inspect for complete (queue)</a:t>
+            </a:r>
+          </a:p>
+          <a:p>
+            <a:endParaRPr lang="en-US" dirty="0"/>
+          </a:p>
+        </p:txBody>
+      </p:sp>
+      <p:sp>
+        <p:nvSpPr>
+          <p:cNvPr id="4" name="Slide Number Placeholder 3"/>
+          <p:cNvSpPr>
+            <a:spLocks noGrp="1"/>
+          </p:cNvSpPr>
+          <p:nvPr>
+            <p:ph type="sldNum" sz="quarter" idx="10"/>
+          </p:nvPr>
+        </p:nvSpPr>
+        <p:spPr/>
+        <p:txBody>
+          <a:bodyPr/>
+          <a:lstStyle/>
+          <a:p>
+            <a:fld id="{2F141AAD-2928-4B43-B2A0-445A59F6B45A}" type="slidenum">
+              <a:rPr lang="en-US" smtClean="0"/>
+              <a:t>18</a:t>
+            </a:fld>
+            <a:endParaRPr lang="en-US"/>
+          </a:p>
+        </p:txBody>
+      </p:sp>
+    </p:spTree>
+    <p:extLst>
+      <p:ext uri="{BB962C8B-B14F-4D97-AF65-F5344CB8AC3E}">
+        <p14:creationId xmlns:p14="http://schemas.microsoft.com/office/powerpoint/2010/main" val="619906070"/>
+      </p:ext>
+    </p:extLst>
+  </p:cSld>
+  <p:clrMapOvr>
+    <a:masterClrMapping/>
+  </p:clrMapOvr>
+</p:notes>
+</file>
+
+<file path=ppt/notesSlides/notesSlide12.xml><?xml version="1.0" encoding="utf-8"?>
+<p:notes xmlns:a="http://schemas.openxmlformats.org/drawingml/2006/main" xmlns:r="http://schemas.openxmlformats.org/officeDocument/2006/relationships" xmlns:p="http://schemas.openxmlformats.org/presentationml/2006/main">
+  <p:cSld>
+    <p:spTree>
+      <p:nvGrpSpPr>
+        <p:cNvPr id="1" name=""/>
+        <p:cNvGrpSpPr/>
+        <p:nvPr/>
+      </p:nvGrpSpPr>
+      <p:grpSpPr>
+        <a:xfrm>
+          <a:off x="0" y="0"/>
+          <a:ext cx="0" cy="0"/>
+          <a:chOff x="0" y="0"/>
+          <a:chExt cx="0" cy="0"/>
+        </a:xfrm>
+      </p:grpSpPr>
+      <p:sp>
+        <p:nvSpPr>
+          <p:cNvPr id="2" name="Slide Image Placeholder 1"/>
+          <p:cNvSpPr>
+            <a:spLocks noGrp="1" noRot="1" noChangeAspect="1"/>
+          </p:cNvSpPr>
+          <p:nvPr>
+            <p:ph type="sldImg"/>
+          </p:nvPr>
+        </p:nvSpPr>
+        <p:spPr/>
+      </p:sp>
+      <p:sp>
+        <p:nvSpPr>
+          <p:cNvPr id="3" name="Notes Placeholder 2"/>
+          <p:cNvSpPr>
+            <a:spLocks noGrp="1"/>
+          </p:cNvSpPr>
+          <p:nvPr>
+            <p:ph type="body" idx="1"/>
+          </p:nvPr>
+        </p:nvSpPr>
+        <p:spPr/>
+        <p:txBody>
+          <a:bodyPr/>
+          <a:lstStyle/>
+          <a:p>
+            <a:r>
+              <a:rPr lang="en-US" dirty="0" smtClean="0"/>
               <a:t>Idempotent: same input = same output</a:t>
             </a:r>
           </a:p>
@@ -808,7 +942,7 @@
           <a:p>
             <a:fld id="{2F141AAD-2928-4B43-B2A0-445A59F6B45A}" type="slidenum">
               <a:rPr lang="en-US" smtClean="0"/>
-              <a:t>18</a:t>
+              <a:t>19</a:t>
             </a:fld>
             <a:endParaRPr lang="en-US"/>
           </a:p>
@@ -1333,11 +1467,7 @@
           <a:p>
             <a:r>
               <a:rPr lang="en-US" dirty="0" smtClean="0"/>
-              <a:t>Compute </a:t>
-            </a:r>
-            <a:r>
-              <a:rPr lang="en-US" dirty="0" smtClean="0"/>
-              <a:t>payment – Consumption</a:t>
+              <a:t>Compute payment – Consumption</a:t>
             </a:r>
             <a:r>
               <a:rPr lang="en-US" baseline="0" dirty="0" smtClean="0"/>
@@ -1659,83 +1789,6 @@
           <a:lstStyle/>
           <a:p>
             <a:r>
-              <a:rPr lang="en-US" dirty="0" smtClean="0"/>
-              <a:t>Show security</a:t>
-            </a:r>
-          </a:p>
-          <a:p>
-            <a:r>
-              <a:rPr lang="en-US" dirty="0" smtClean="0"/>
-              <a:t>Show bindings</a:t>
-            </a:r>
-          </a:p>
-          <a:p>
-            <a:r>
-              <a:rPr lang="en-US" dirty="0" smtClean="0"/>
-              <a:t>Show</a:t>
-            </a:r>
-            <a:r>
-              <a:rPr lang="en-US" baseline="0" dirty="0" smtClean="0"/>
-              <a:t> dependencies (</a:t>
-            </a:r>
-            <a:r>
-              <a:rPr lang="en-US" baseline="0" dirty="0" err="1" smtClean="0"/>
-              <a:t>npn</a:t>
-            </a:r>
-            <a:r>
-              <a:rPr lang="en-US" baseline="0" dirty="0" smtClean="0"/>
-              <a:t>, </a:t>
-            </a:r>
-            <a:r>
-              <a:rPr lang="en-US" baseline="0" dirty="0" err="1" smtClean="0"/>
-              <a:t>nuget</a:t>
-            </a:r>
-            <a:r>
-              <a:rPr lang="en-US" baseline="0" dirty="0" smtClean="0"/>
-              <a:t>, pip)</a:t>
-            </a:r>
-          </a:p>
-          <a:p>
-            <a:pPr marL="0" marR="0" lvl="0" indent="0" algn="l" defTabSz="914400" rtl="0" eaLnBrk="1" fontAlgn="auto" latinLnBrk="0" hangingPunct="1">
-              <a:lnSpc>
-                <a:spcPct val="100000"/>
-              </a:lnSpc>
-              <a:spcBef>
-                <a:spcPts val="0"/>
-              </a:spcBef>
-              <a:spcAft>
-                <a:spcPts val="0"/>
-              </a:spcAft>
-              <a:buClrTx/>
-              <a:buSzTx/>
-              <a:buFontTx/>
-              <a:buNone/>
-              <a:tabLst/>
-              <a:defRPr/>
-            </a:pPr>
-            <a:r>
-              <a:rPr lang="en-US" baseline="0" dirty="0" smtClean="0"/>
-              <a:t>	internal: refer to another file or put into a .</a:t>
-            </a:r>
-            <a:r>
-              <a:rPr lang="en-US" baseline="0" dirty="0" err="1" smtClean="0"/>
-              <a:t>dll</a:t>
-            </a:r>
-            <a:endParaRPr lang="en-US" baseline="0" dirty="0" smtClean="0"/>
-          </a:p>
-          <a:p>
-            <a:r>
-              <a:rPr lang="en-US" baseline="0" dirty="0" smtClean="0"/>
-              <a:t>	externa: put in </a:t>
-            </a:r>
-            <a:r>
-              <a:rPr lang="en-US" baseline="0" dirty="0" err="1" smtClean="0"/>
-              <a:t>project.json</a:t>
-            </a:r>
-            <a:endParaRPr lang="en-US" baseline="0" dirty="0" smtClean="0"/>
-          </a:p>
-          <a:p>
-            <a:r>
               <a:rPr lang="en-US" baseline="0" dirty="0" smtClean="0"/>
               <a:t>	</a:t>
             </a:r>
@@ -1826,29 +1879,50 @@
           <a:bodyPr/>
           <a:lstStyle/>
           <a:p>
+            <a:pPr marL="0" marR="0" lvl="0" indent="0" algn="l" defTabSz="914400" rtl="0" eaLnBrk="1" fontAlgn="auto" latinLnBrk="0" hangingPunct="1">
+              <a:lnSpc>
+                <a:spcPct val="100000"/>
+              </a:lnSpc>
+              <a:spcBef>
+                <a:spcPts val="0"/>
+              </a:spcBef>
+              <a:spcAft>
+                <a:spcPts val="0"/>
+              </a:spcAft>
+              <a:buClrTx/>
+              <a:buSzTx/>
+              <a:buFontTx/>
+              <a:buNone/>
+              <a:tabLst/>
+              <a:defRPr/>
+            </a:pPr>
             <a:r>
               <a:rPr lang="en-US" baseline="0" dirty="0" smtClean="0"/>
-              <a:t>Every minute, get stock ticker and put it on the queue</a:t>
-            </a:r>
+              <a:t>internal: refer to another AF file or put into a .</a:t>
+            </a:r>
+            <a:r>
+              <a:rPr lang="en-US" baseline="0" dirty="0" err="1" smtClean="0"/>
+              <a:t>dll</a:t>
+            </a:r>
+            <a:endParaRPr lang="en-US" baseline="0" dirty="0" smtClean="0"/>
           </a:p>
           <a:p>
             <a:r>
               <a:rPr lang="en-US" baseline="0" dirty="0" smtClean="0"/>
-              <a:t>Get values from queue, validate it, and put it into a table</a:t>
-            </a:r>
+              <a:t>external: put in </a:t>
+            </a:r>
+            <a:r>
+              <a:rPr lang="en-US" baseline="0" dirty="0" err="1" smtClean="0"/>
+              <a:t>project.json</a:t>
+            </a:r>
+            <a:endParaRPr lang="en-US" baseline="0" dirty="0" smtClean="0"/>
           </a:p>
           <a:p>
             <a:r>
               <a:rPr lang="en-US" baseline="0" dirty="0" smtClean="0"/>
-              <a:t>Get values from table, do some analysis, and notify</a:t>
-            </a:r>
-          </a:p>
-          <a:p>
-            <a:r>
-              <a:rPr lang="en-US" baseline="0" dirty="0" smtClean="0"/>
-              <a:t> </a:t>
-            </a:r>
-            <a:endParaRPr lang="en-US" dirty="0" smtClean="0"/>
+              <a:t>Only 4.6 and above</a:t>
+            </a:r>
+            <a:endParaRPr lang="en-US" baseline="0" dirty="0" smtClean="0"/>
           </a:p>
         </p:txBody>
       </p:sp>
@@ -1878,7 +1952,7 @@
     </p:spTree>
     <p:extLst>
       <p:ext uri="{BB962C8B-B14F-4D97-AF65-F5344CB8AC3E}">
-        <p14:creationId xmlns:p14="http://schemas.microsoft.com/office/powerpoint/2010/main" val="46495196"/>
+        <p14:creationId xmlns:p14="http://schemas.microsoft.com/office/powerpoint/2010/main" val="1907428130"/>
       </p:ext>
     </p:extLst>
   </p:cSld>
@@ -5364,11 +5438,7 @@
           <a:p>
             <a:r>
               <a:rPr lang="en-US" dirty="0" smtClean="0"/>
-              <a:t>Example(s) </a:t>
-            </a:r>
-            <a:r>
-              <a:rPr lang="en-US" dirty="0" smtClean="0"/>
-              <a:t>#2</a:t>
+              <a:t>Example(s) #2</a:t>
             </a:r>
             <a:endParaRPr lang="en-US" dirty="0"/>
           </a:p>
@@ -5685,33 +5755,10 @@
             <p:ph type="title"/>
           </p:nvPr>
         </p:nvSpPr>
-        <p:spPr/>
-        <p:txBody>
-          <a:bodyPr/>
-          <a:lstStyle/>
-          <a:p>
-            <a:r>
-              <a:rPr lang="en-US" dirty="0" smtClean="0"/>
-              <a:t>Anatomy of an Azure Function</a:t>
-            </a:r>
-            <a:endParaRPr lang="en-US" dirty="0"/>
-          </a:p>
-        </p:txBody>
-      </p:sp>
-      <p:sp>
-        <p:nvSpPr>
-          <p:cNvPr id="5" name="Content Placeholder 2"/>
-          <p:cNvSpPr>
-            <a:spLocks noGrp="1"/>
-          </p:cNvSpPr>
-          <p:nvPr>
-            <p:ph idx="1"/>
-          </p:nvPr>
-        </p:nvSpPr>
         <p:spPr>
           <a:xfrm>
-            <a:off x="838200" y="1825625"/>
-            <a:ext cx="10515600" cy="1682346"/>
+            <a:off x="838200" y="365125"/>
+            <a:ext cx="2087880" cy="1325563"/>
           </a:xfrm>
         </p:spPr>
         <p:txBody>
@@ -5720,27 +5767,36 @@
           <a:p>
             <a:r>
               <a:rPr lang="en-US" dirty="0" smtClean="0"/>
-              <a:t>Script file</a:t>
-            </a:r>
-          </a:p>
-          <a:p>
-            <a:r>
-              <a:rPr lang="en-US" dirty="0" smtClean="0"/>
-              <a:t>Configuration file</a:t>
-            </a:r>
-          </a:p>
-          <a:p>
-            <a:r>
-              <a:rPr lang="en-US" dirty="0" smtClean="0"/>
-              <a:t>Dependencies</a:t>
-            </a:r>
-            <a:endParaRPr lang="en-US" dirty="0" smtClean="0"/>
-          </a:p>
-          <a:p>
+              <a:t>Security</a:t>
+            </a:r>
             <a:endParaRPr lang="en-US" dirty="0"/>
           </a:p>
         </p:txBody>
       </p:sp>
+      <p:pic>
+        <p:nvPicPr>
+          <p:cNvPr id="6" name="Picture 5"/>
+          <p:cNvPicPr>
+            <a:picLocks noChangeAspect="1"/>
+          </p:cNvPicPr>
+          <p:nvPr/>
+        </p:nvPicPr>
+        <p:blipFill>
+          <a:blip r:embed="rId3"/>
+          <a:stretch>
+            <a:fillRect/>
+          </a:stretch>
+        </p:blipFill>
+        <p:spPr>
+          <a:xfrm>
+            <a:off x="3740728" y="365125"/>
+            <a:ext cx="7845829" cy="6177818"/>
+          </a:xfrm>
+          <a:prstGeom prst="rect">
+            <a:avLst/>
+          </a:prstGeom>
+        </p:spPr>
+      </p:pic>
     </p:spTree>
     <p:extLst>
       <p:ext uri="{BB962C8B-B14F-4D97-AF65-F5344CB8AC3E}">
@@ -5795,6 +5851,195 @@
           <a:p>
             <a:r>
               <a:rPr lang="en-US" dirty="0" smtClean="0"/>
+              <a:t>.NET Dependencies</a:t>
+            </a:r>
+            <a:endParaRPr lang="en-US" dirty="0"/>
+          </a:p>
+        </p:txBody>
+      </p:sp>
+      <p:sp>
+        <p:nvSpPr>
+          <p:cNvPr id="4" name="TextBox 3"/>
+          <p:cNvSpPr txBox="1"/>
+          <p:nvPr/>
+        </p:nvSpPr>
+        <p:spPr>
+          <a:xfrm>
+            <a:off x="838200" y="1690688"/>
+            <a:ext cx="2320636" cy="369332"/>
+          </a:xfrm>
+          <a:prstGeom prst="rect">
+            <a:avLst/>
+          </a:prstGeom>
+          <a:noFill/>
+        </p:spPr>
+        <p:txBody>
+          <a:bodyPr wrap="square" rtlCol="0">
+            <a:spAutoFit/>
+          </a:bodyPr>
+          <a:lstStyle/>
+          <a:p>
+            <a:r>
+              <a:rPr lang="en-US" dirty="0" err="1"/>
+              <a:t>p</a:t>
+            </a:r>
+            <a:r>
+              <a:rPr lang="en-US" dirty="0" err="1" smtClean="0"/>
+              <a:t>roject.json</a:t>
+            </a:r>
+            <a:endParaRPr lang="en-US" dirty="0"/>
+          </a:p>
+        </p:txBody>
+      </p:sp>
+      <p:pic>
+        <p:nvPicPr>
+          <p:cNvPr id="5" name="Picture 4"/>
+          <p:cNvPicPr>
+            <a:picLocks noChangeAspect="1"/>
+          </p:cNvPicPr>
+          <p:nvPr/>
+        </p:nvPicPr>
+        <p:blipFill>
+          <a:blip r:embed="rId3"/>
+          <a:stretch>
+            <a:fillRect/>
+          </a:stretch>
+        </p:blipFill>
+        <p:spPr>
+          <a:xfrm>
+            <a:off x="838200" y="2348699"/>
+            <a:ext cx="3698824" cy="2073767"/>
+          </a:xfrm>
+          <a:prstGeom prst="rect">
+            <a:avLst/>
+          </a:prstGeom>
+        </p:spPr>
+      </p:pic>
+      <p:sp>
+        <p:nvSpPr>
+          <p:cNvPr id="6" name="TextBox 5"/>
+          <p:cNvSpPr txBox="1"/>
+          <p:nvPr/>
+        </p:nvSpPr>
+        <p:spPr>
+          <a:xfrm>
+            <a:off x="7082443" y="1690688"/>
+            <a:ext cx="2992582" cy="369332"/>
+          </a:xfrm>
+          <a:prstGeom prst="rect">
+            <a:avLst/>
+          </a:prstGeom>
+          <a:noFill/>
+        </p:spPr>
+        <p:txBody>
+          <a:bodyPr wrap="square" rtlCol="0">
+            <a:spAutoFit/>
+          </a:bodyPr>
+          <a:lstStyle/>
+          <a:p>
+            <a:r>
+              <a:rPr lang="en-US" dirty="0" smtClean="0"/>
+              <a:t>Another Azure Function</a:t>
+            </a:r>
+            <a:endParaRPr lang="en-US" dirty="0"/>
+          </a:p>
+        </p:txBody>
+      </p:sp>
+      <p:pic>
+        <p:nvPicPr>
+          <p:cNvPr id="8" name="Picture 7"/>
+          <p:cNvPicPr>
+            <a:picLocks noChangeAspect="1"/>
+          </p:cNvPicPr>
+          <p:nvPr/>
+        </p:nvPicPr>
+        <p:blipFill>
+          <a:blip r:embed="rId4"/>
+          <a:stretch>
+            <a:fillRect/>
+          </a:stretch>
+        </p:blipFill>
+        <p:spPr>
+          <a:xfrm>
+            <a:off x="6828386" y="2135188"/>
+            <a:ext cx="4819650" cy="1762125"/>
+          </a:xfrm>
+          <a:prstGeom prst="rect">
+            <a:avLst/>
+          </a:prstGeom>
+        </p:spPr>
+      </p:pic>
+      <p:pic>
+        <p:nvPicPr>
+          <p:cNvPr id="9" name="Picture 8"/>
+          <p:cNvPicPr>
+            <a:picLocks noChangeAspect="1"/>
+          </p:cNvPicPr>
+          <p:nvPr/>
+        </p:nvPicPr>
+        <p:blipFill>
+          <a:blip r:embed="rId5"/>
+          <a:stretch>
+            <a:fillRect/>
+          </a:stretch>
+        </p:blipFill>
+        <p:spPr>
+          <a:xfrm>
+            <a:off x="7855960" y="4092432"/>
+            <a:ext cx="2764501" cy="2444223"/>
+          </a:xfrm>
+          <a:prstGeom prst="rect">
+            <a:avLst/>
+          </a:prstGeom>
+        </p:spPr>
+      </p:pic>
+    </p:spTree>
+    <p:extLst>
+      <p:ext uri="{BB962C8B-B14F-4D97-AF65-F5344CB8AC3E}">
+        <p14:creationId xmlns:p14="http://schemas.microsoft.com/office/powerpoint/2010/main" val="2609395551"/>
+      </p:ext>
+    </p:extLst>
+  </p:cSld>
+  <p:clrMapOvr>
+    <a:masterClrMapping/>
+  </p:clrMapOvr>
+</p:sld>
+</file>
+
+<file path=ppt/slides/slide17.xml><?xml version="1.0" encoding="utf-8"?>
+<p:sld xmlns:a="http://schemas.openxmlformats.org/drawingml/2006/main" xmlns:r="http://schemas.openxmlformats.org/officeDocument/2006/relationships" xmlns:p="http://schemas.openxmlformats.org/presentationml/2006/main">
+  <p:cSld>
+    <p:spTree>
+      <p:nvGrpSpPr>
+        <p:cNvPr id="1" name=""/>
+        <p:cNvGrpSpPr/>
+        <p:nvPr/>
+      </p:nvGrpSpPr>
+      <p:grpSpPr>
+        <a:xfrm>
+          <a:off x="0" y="0"/>
+          <a:ext cx="0" cy="0"/>
+          <a:chOff x="0" y="0"/>
+          <a:chExt cx="0" cy="0"/>
+        </a:xfrm>
+      </p:grpSpPr>
+      <p:sp>
+        <p:nvSpPr>
+          <p:cNvPr id="2" name="Title 1"/>
+          <p:cNvSpPr>
+            <a:spLocks noGrp="1"/>
+          </p:cNvSpPr>
+          <p:nvPr>
+            <p:ph type="title"/>
+          </p:nvPr>
+        </p:nvSpPr>
+        <p:spPr/>
+        <p:txBody>
+          <a:bodyPr/>
+          <a:lstStyle/>
+          <a:p>
+            <a:r>
+              <a:rPr lang="en-US" dirty="0" smtClean="0"/>
               <a:t>Example #3</a:t>
             </a:r>
             <a:endParaRPr lang="en-US" dirty="0"/>
@@ -5882,7 +6127,7 @@
             <a:pPr algn="ctr"/>
             <a:r>
               <a:rPr lang="en-US" dirty="0" smtClean="0"/>
-              <a:t>Queue Trigger</a:t>
+              <a:t>Table Trigger</a:t>
             </a:r>
             <a:endParaRPr lang="en-US" dirty="0"/>
           </a:p>
@@ -5896,7 +6141,7 @@
         </p:nvSpPr>
         <p:spPr>
           <a:xfrm>
-            <a:off x="2558251" y="3017517"/>
+            <a:off x="6319675" y="1740563"/>
             <a:ext cx="1130531" cy="1014153"/>
           </a:xfrm>
           <a:prstGeom prst="flowChartMagneticDisk">
@@ -5940,7 +6185,7 @@
         </p:nvSpPr>
         <p:spPr>
           <a:xfrm>
-            <a:off x="6366857" y="1752081"/>
+            <a:off x="2664299" y="3000891"/>
             <a:ext cx="947650" cy="1014153"/>
           </a:xfrm>
           <a:prstGeom prst="flowChartMagneticDrum">
@@ -5966,10 +6211,6 @@
           <a:lstStyle/>
           <a:p>
             <a:pPr algn="ctr"/>
-            <a:r>
-              <a:rPr lang="en-US" dirty="0" smtClean="0"/>
-              <a:t>OK</a:t>
-            </a:r>
             <a:endParaRPr lang="en-US" dirty="0"/>
           </a:p>
         </p:txBody>
@@ -6012,54 +6253,7 @@
             <a:pPr algn="ctr"/>
             <a:r>
               <a:rPr lang="en-US" dirty="0" smtClean="0"/>
-              <a:t>Table Trigger</a:t>
-            </a:r>
-            <a:endParaRPr lang="en-US" dirty="0"/>
-          </a:p>
-        </p:txBody>
-      </p:sp>
-      <p:sp>
-        <p:nvSpPr>
-          <p:cNvPr id="38" name="Flowchart: Direct Access Storage 37"/>
-          <p:cNvSpPr/>
-          <p:nvPr/>
-        </p:nvSpPr>
-        <p:spPr>
-          <a:xfrm>
-            <a:off x="6366857" y="4356810"/>
-            <a:ext cx="947650" cy="1014153"/>
-          </a:xfrm>
-          <a:prstGeom prst="flowChartMagneticDrum">
-            <a:avLst/>
-          </a:prstGeom>
-          <a:solidFill>
-            <a:srgbClr val="FF0000"/>
-          </a:solidFill>
-        </p:spPr>
-        <p:style>
-          <a:lnRef idx="1">
-            <a:schemeClr val="accent2"/>
-          </a:lnRef>
-          <a:fillRef idx="3">
-            <a:schemeClr val="accent2"/>
-          </a:fillRef>
-          <a:effectRef idx="2">
-            <a:schemeClr val="accent2"/>
-          </a:effectRef>
-          <a:fontRef idx="minor">
-            <a:schemeClr val="lt1"/>
-          </a:fontRef>
-        </p:style>
-        <p:txBody>
-          <a:bodyPr rtlCol="0" anchor="ctr"/>
-          <a:lstStyle/>
-          <a:p>
-            <a:pPr algn="ctr"/>
-            <a:r>
-              <a:rPr lang="en-US" dirty="0" smtClean="0">
-                <a:sym typeface="Wingdings" panose="05000000000000000000" pitchFamily="2" charset="2"/>
-              </a:rPr>
-              <a:t></a:t>
+              <a:t>Queue Trigger</a:t>
             </a:r>
             <a:endParaRPr lang="en-US" dirty="0"/>
           </a:p>
@@ -6247,53 +6441,6 @@
       </p:sp>
       <p:sp>
         <p:nvSpPr>
-          <p:cNvPr id="45" name="Bent Arrow 44"/>
-          <p:cNvSpPr/>
-          <p:nvPr/>
-        </p:nvSpPr>
-        <p:spPr>
-          <a:xfrm rot="10800000" flipH="1">
-            <a:off x="5218225" y="4293519"/>
-            <a:ext cx="1052744" cy="786505"/>
-          </a:xfrm>
-          <a:prstGeom prst="bentArrow">
-            <a:avLst/>
-          </a:prstGeom>
-          <a:solidFill>
-            <a:srgbClr val="FF0000"/>
-          </a:solidFill>
-        </p:spPr>
-        <p:style>
-          <a:lnRef idx="2">
-            <a:schemeClr val="accent1">
-              <a:shade val="50000"/>
-            </a:schemeClr>
-          </a:lnRef>
-          <a:fillRef idx="1">
-            <a:schemeClr val="accent1"/>
-          </a:fillRef>
-          <a:effectRef idx="0">
-            <a:schemeClr val="accent1"/>
-          </a:effectRef>
-          <a:fontRef idx="minor">
-            <a:schemeClr val="lt1"/>
-          </a:fontRef>
-        </p:style>
-        <p:txBody>
-          <a:bodyPr rtlCol="0" anchor="ctr"/>
-          <a:lstStyle/>
-          <a:p>
-            <a:pPr algn="ctr"/>
-            <a:endParaRPr lang="en-US">
-              <a:solidFill>
-                <a:schemeClr val="tx1"/>
-              </a:solidFill>
-            </a:endParaRPr>
-          </a:p>
-        </p:txBody>
-      </p:sp>
-      <p:sp>
-        <p:nvSpPr>
           <p:cNvPr id="46" name="Bent Arrow 45"/>
           <p:cNvSpPr/>
           <p:nvPr/>
@@ -6462,173 +6609,6 @@
     <p:extLst>
       <p:ext uri="{BB962C8B-B14F-4D97-AF65-F5344CB8AC3E}">
         <p14:creationId xmlns:p14="http://schemas.microsoft.com/office/powerpoint/2010/main" val="3963682226"/>
-      </p:ext>
-    </p:extLst>
-  </p:cSld>
-  <p:clrMapOvr>
-    <a:masterClrMapping/>
-  </p:clrMapOvr>
-  <p:timing>
-    <p:tnLst>
-      <p:par>
-        <p:cTn id="1" dur="indefinite" restart="never" nodeType="tmRoot"/>
-      </p:par>
-    </p:tnLst>
-  </p:timing>
-</p:sld>
-</file>
-
-<file path=ppt/slides/slide17.xml><?xml version="1.0" encoding="utf-8"?>
-<p:sld xmlns:a="http://schemas.openxmlformats.org/drawingml/2006/main" xmlns:r="http://schemas.openxmlformats.org/officeDocument/2006/relationships" xmlns:p="http://schemas.openxmlformats.org/presentationml/2006/main">
-  <p:cSld>
-    <p:spTree>
-      <p:nvGrpSpPr>
-        <p:cNvPr id="1" name=""/>
-        <p:cNvGrpSpPr/>
-        <p:nvPr/>
-      </p:nvGrpSpPr>
-      <p:grpSpPr>
-        <a:xfrm>
-          <a:off x="0" y="0"/>
-          <a:ext cx="0" cy="0"/>
-          <a:chOff x="0" y="0"/>
-          <a:chExt cx="0" cy="0"/>
-        </a:xfrm>
-      </p:grpSpPr>
-      <p:sp>
-        <p:nvSpPr>
-          <p:cNvPr id="2" name="Title 1"/>
-          <p:cNvSpPr>
-            <a:spLocks noGrp="1"/>
-          </p:cNvSpPr>
-          <p:nvPr>
-            <p:ph type="title"/>
-          </p:nvPr>
-        </p:nvSpPr>
-        <p:spPr/>
-        <p:txBody>
-          <a:bodyPr/>
-          <a:lstStyle/>
-          <a:p>
-            <a:r>
-              <a:rPr lang="en-US" dirty="0" smtClean="0"/>
-              <a:t>Serverless Best Practices</a:t>
-            </a:r>
-            <a:endParaRPr lang="en-US" dirty="0"/>
-          </a:p>
-        </p:txBody>
-      </p:sp>
-      <p:sp>
-        <p:nvSpPr>
-          <p:cNvPr id="3" name="Content Placeholder 2"/>
-          <p:cNvSpPr>
-            <a:spLocks noGrp="1"/>
-          </p:cNvSpPr>
-          <p:nvPr>
-            <p:ph idx="1"/>
-          </p:nvPr>
-        </p:nvSpPr>
-        <p:spPr/>
-        <p:txBody>
-          <a:bodyPr>
-            <a:normAutofit lnSpcReduction="10000"/>
-          </a:bodyPr>
-          <a:lstStyle/>
-          <a:p>
-            <a:r>
-              <a:rPr lang="en-US" dirty="0" smtClean="0"/>
-              <a:t>Thick Clients:  Thin and Stateless Server</a:t>
-            </a:r>
-          </a:p>
-          <a:p>
-            <a:pPr lvl="1"/>
-            <a:r>
-              <a:rPr lang="en-US" dirty="0" smtClean="0"/>
-              <a:t>SPA model:  Angular/React</a:t>
-            </a:r>
-          </a:p>
-          <a:p>
-            <a:pPr lvl="1"/>
-            <a:endParaRPr lang="en-US" dirty="0"/>
-          </a:p>
-          <a:p>
-            <a:endParaRPr lang="en-US" dirty="0" smtClean="0"/>
-          </a:p>
-          <a:p>
-            <a:r>
-              <a:rPr lang="en-US" dirty="0" smtClean="0"/>
-              <a:t>Can do sync, but really want to do </a:t>
-            </a:r>
-            <a:r>
-              <a:rPr lang="en-US" dirty="0" err="1" smtClean="0"/>
-              <a:t>async</a:t>
-            </a:r>
-            <a:endParaRPr lang="en-US" dirty="0" smtClean="0"/>
-          </a:p>
-          <a:p>
-            <a:pPr lvl="1"/>
-            <a:r>
-              <a:rPr lang="en-US" dirty="0">
-                <a:hlinkClick r:id="rId3"/>
-              </a:rPr>
-              <a:t>http://</a:t>
-            </a:r>
-            <a:r>
-              <a:rPr lang="en-US" dirty="0" smtClean="0">
-                <a:hlinkClick r:id="rId3"/>
-              </a:rPr>
-              <a:t>www.reactivemanifesto.org/</a:t>
-            </a:r>
-            <a:endParaRPr lang="en-US" dirty="0" smtClean="0"/>
-          </a:p>
-          <a:p>
-            <a:pPr lvl="1"/>
-            <a:r>
-              <a:rPr lang="en-US" dirty="0" smtClean="0"/>
-              <a:t>Kick off long running job.  Use queues to hold intermediate data</a:t>
-            </a:r>
-          </a:p>
-          <a:p>
-            <a:pPr lvl="1"/>
-            <a:r>
-              <a:rPr lang="en-US" dirty="0" smtClean="0"/>
-              <a:t>Return </a:t>
-            </a:r>
-            <a:r>
-              <a:rPr lang="en-US" dirty="0" smtClean="0"/>
-              <a:t>202, not 201</a:t>
-            </a:r>
-          </a:p>
-          <a:p>
-            <a:pPr lvl="1"/>
-            <a:endParaRPr lang="en-US" dirty="0"/>
-          </a:p>
-          <a:p>
-            <a:r>
-              <a:rPr lang="en-US" dirty="0" smtClean="0"/>
-              <a:t>This is all-in on the cloud</a:t>
-            </a:r>
-          </a:p>
-          <a:p>
-            <a:pPr lvl="1"/>
-            <a:r>
-              <a:rPr lang="en-US" dirty="0" smtClean="0"/>
-              <a:t>Design for portability </a:t>
-            </a:r>
-            <a:r>
-              <a:rPr lang="en-US" dirty="0" smtClean="0">
-                <a:sym typeface="Wingdings" panose="05000000000000000000" pitchFamily="2" charset="2"/>
-              </a:rPr>
-              <a:t></a:t>
-            </a:r>
-            <a:endParaRPr lang="en-US" dirty="0"/>
-          </a:p>
-        </p:txBody>
-      </p:sp>
-    </p:spTree>
-    <p:extLst>
-      <p:ext uri="{BB962C8B-B14F-4D97-AF65-F5344CB8AC3E}">
-        <p14:creationId xmlns:p14="http://schemas.microsoft.com/office/powerpoint/2010/main" val="1975748057"/>
       </p:ext>
     </p:extLst>
   </p:cSld>
@@ -6679,40 +6659,119 @@
           <a:p>
             <a:r>
               <a:rPr lang="en-US" dirty="0" smtClean="0"/>
-              <a:t>Functions Best Practices</a:t>
+              <a:t>Serverless Best Practices</a:t>
             </a:r>
             <a:endParaRPr lang="en-US" dirty="0"/>
           </a:p>
         </p:txBody>
       </p:sp>
-      <p:pic>
-        <p:nvPicPr>
-          <p:cNvPr id="4" name="Picture 3"/>
-          <p:cNvPicPr>
-            <a:picLocks noChangeAspect="1"/>
-          </p:cNvPicPr>
-          <p:nvPr/>
-        </p:nvPicPr>
-        <p:blipFill>
-          <a:blip r:embed="rId3"/>
-          <a:stretch>
-            <a:fillRect/>
-          </a:stretch>
-        </p:blipFill>
-        <p:spPr>
-          <a:xfrm>
-            <a:off x="942372" y="1930855"/>
-            <a:ext cx="7772670" cy="4246108"/>
-          </a:xfrm>
-          <a:prstGeom prst="rect">
-            <a:avLst/>
-          </a:prstGeom>
-        </p:spPr>
-      </p:pic>
+      <p:sp>
+        <p:nvSpPr>
+          <p:cNvPr id="3" name="Content Placeholder 2"/>
+          <p:cNvSpPr>
+            <a:spLocks noGrp="1"/>
+          </p:cNvSpPr>
+          <p:nvPr>
+            <p:ph idx="1"/>
+          </p:nvPr>
+        </p:nvSpPr>
+        <p:spPr/>
+        <p:txBody>
+          <a:bodyPr>
+            <a:normAutofit lnSpcReduction="10000"/>
+          </a:bodyPr>
+          <a:lstStyle/>
+          <a:p>
+            <a:r>
+              <a:rPr lang="en-US" dirty="0" smtClean="0"/>
+              <a:t>Thick Clients:  Thin and Stateless Server</a:t>
+            </a:r>
+          </a:p>
+          <a:p>
+            <a:pPr lvl="1"/>
+            <a:r>
+              <a:rPr lang="en-US" dirty="0" smtClean="0"/>
+              <a:t>SPA model:  Angular/React</a:t>
+            </a:r>
+          </a:p>
+          <a:p>
+            <a:pPr lvl="1"/>
+            <a:endParaRPr lang="en-US" dirty="0"/>
+          </a:p>
+          <a:p>
+            <a:endParaRPr lang="en-US" dirty="0" smtClean="0"/>
+          </a:p>
+          <a:p>
+            <a:r>
+              <a:rPr lang="en-US" dirty="0" smtClean="0"/>
+              <a:t>Can do sync, but really want to do </a:t>
+            </a:r>
+            <a:r>
+              <a:rPr lang="en-US" dirty="0" err="1" smtClean="0"/>
+              <a:t>async</a:t>
+            </a:r>
+            <a:endParaRPr lang="en-US" dirty="0" smtClean="0"/>
+          </a:p>
+          <a:p>
+            <a:pPr lvl="1"/>
+            <a:r>
+              <a:rPr lang="en-US" dirty="0">
+                <a:hlinkClick r:id="rId3"/>
+              </a:rPr>
+              <a:t>http://</a:t>
+            </a:r>
+            <a:r>
+              <a:rPr lang="en-US" dirty="0" smtClean="0">
+                <a:hlinkClick r:id="rId3"/>
+              </a:rPr>
+              <a:t>www.reactivemanifesto.org/</a:t>
+            </a:r>
+            <a:endParaRPr lang="en-US" dirty="0" smtClean="0"/>
+          </a:p>
+          <a:p>
+            <a:pPr lvl="1"/>
+            <a:r>
+              <a:rPr lang="en-US" dirty="0" smtClean="0"/>
+              <a:t>Kick off long running job.  Use queues to hold intermediate data</a:t>
+            </a:r>
+          </a:p>
+          <a:p>
+            <a:pPr lvl="1"/>
+            <a:r>
+              <a:rPr lang="en-US" dirty="0" smtClean="0"/>
+              <a:t>Return 202, not 201</a:t>
+            </a:r>
+          </a:p>
+          <a:p>
+            <a:pPr lvl="1"/>
+            <a:endParaRPr lang="en-US" dirty="0"/>
+          </a:p>
+          <a:p>
+            <a:r>
+              <a:rPr lang="en-US" dirty="0" smtClean="0"/>
+              <a:t>This is all-in on the cloud</a:t>
+            </a:r>
+          </a:p>
+          <a:p>
+            <a:pPr lvl="1"/>
+            <a:r>
+              <a:rPr lang="en-US" dirty="0" smtClean="0"/>
+              <a:t>Design for portability </a:t>
+            </a:r>
+            <a:r>
+              <a:rPr lang="en-US" dirty="0" smtClean="0">
+                <a:sym typeface="Wingdings" panose="05000000000000000000" pitchFamily="2" charset="2"/>
+              </a:rPr>
+              <a:t></a:t>
+            </a:r>
+            <a:endParaRPr lang="en-US" dirty="0"/>
+          </a:p>
+        </p:txBody>
+      </p:sp>
     </p:spTree>
     <p:extLst>
       <p:ext uri="{BB962C8B-B14F-4D97-AF65-F5344CB8AC3E}">
-        <p14:creationId xmlns:p14="http://schemas.microsoft.com/office/powerpoint/2010/main" val="1196570845"/>
+        <p14:creationId xmlns:p14="http://schemas.microsoft.com/office/powerpoint/2010/main" val="1975748057"/>
       </p:ext>
     </p:extLst>
   </p:cSld>
@@ -6763,131 +6822,40 @@
           <a:p>
             <a:r>
               <a:rPr lang="en-US" dirty="0" smtClean="0"/>
-              <a:t>Functional Architecture</a:t>
+              <a:t>Functions Best Practices</a:t>
             </a:r>
             <a:endParaRPr lang="en-US" dirty="0"/>
           </a:p>
         </p:txBody>
       </p:sp>
-      <p:sp>
-        <p:nvSpPr>
-          <p:cNvPr id="3" name="Content Placeholder 2"/>
-          <p:cNvSpPr>
-            <a:spLocks noGrp="1"/>
-          </p:cNvSpPr>
-          <p:nvPr>
-            <p:ph idx="1"/>
-          </p:nvPr>
-        </p:nvSpPr>
+      <p:pic>
+        <p:nvPicPr>
+          <p:cNvPr id="4" name="Picture 3"/>
+          <p:cNvPicPr>
+            <a:picLocks noChangeAspect="1"/>
+          </p:cNvPicPr>
+          <p:nvPr/>
+        </p:nvPicPr>
+        <p:blipFill>
+          <a:blip r:embed="rId3"/>
+          <a:stretch>
+            <a:fillRect/>
+          </a:stretch>
+        </p:blipFill>
         <p:spPr>
           <a:xfrm>
-            <a:off x="960699" y="1825625"/>
-            <a:ext cx="10393101" cy="4351338"/>
+            <a:off x="942372" y="1930855"/>
+            <a:ext cx="7772670" cy="4246108"/>
           </a:xfrm>
+          <a:prstGeom prst="rect">
+            <a:avLst/>
+          </a:prstGeom>
         </p:spPr>
-        <p:txBody>
-          <a:bodyPr/>
-          <a:lstStyle/>
-          <a:p>
-            <a:r>
-              <a:rPr lang="en-US" dirty="0" smtClean="0"/>
-              <a:t>Microservices</a:t>
-            </a:r>
-          </a:p>
-          <a:p>
-            <a:pPr lvl="1"/>
-            <a:r>
-              <a:rPr lang="en-US" dirty="0" smtClean="0"/>
-              <a:t>Small, Independent Services</a:t>
-            </a:r>
-          </a:p>
-          <a:p>
-            <a:pPr lvl="1"/>
-            <a:r>
-              <a:rPr lang="en-US" dirty="0" smtClean="0"/>
-              <a:t>Independent deployments</a:t>
-            </a:r>
-          </a:p>
-          <a:p>
-            <a:pPr lvl="1"/>
-            <a:r>
-              <a:rPr lang="en-US" dirty="0" smtClean="0"/>
-              <a:t>Versioning is important</a:t>
-            </a:r>
-          </a:p>
-          <a:p>
-            <a:pPr lvl="1"/>
-            <a:r>
-              <a:rPr lang="en-US" dirty="0" smtClean="0"/>
-              <a:t>Async messages among functions,  not </a:t>
-            </a:r>
-            <a:r>
-              <a:rPr lang="en-US" dirty="0" err="1"/>
-              <a:t>S</a:t>
-            </a:r>
-            <a:r>
-              <a:rPr lang="en-US" dirty="0" err="1" smtClean="0"/>
-              <a:t>ych</a:t>
-            </a:r>
-            <a:r>
-              <a:rPr lang="en-US" dirty="0" smtClean="0"/>
-              <a:t> http</a:t>
-            </a:r>
-          </a:p>
-          <a:p>
-            <a:pPr lvl="1"/>
-            <a:endParaRPr lang="en-US" dirty="0"/>
-          </a:p>
-          <a:p>
-            <a:r>
-              <a:rPr lang="en-US" dirty="0" smtClean="0"/>
-              <a:t>Avoid shared state</a:t>
-            </a:r>
-          </a:p>
-          <a:p>
-            <a:pPr lvl="1"/>
-            <a:r>
-              <a:rPr lang="en-US" dirty="0" smtClean="0"/>
-              <a:t>Can store connection manager or </a:t>
-            </a:r>
-            <a:r>
-              <a:rPr lang="en-US" dirty="0" err="1" smtClean="0"/>
-              <a:t>redis</a:t>
-            </a:r>
-            <a:r>
-              <a:rPr lang="en-US" dirty="0" smtClean="0"/>
-              <a:t> cache on a machine</a:t>
-            </a:r>
-          </a:p>
-          <a:p>
-            <a:pPr lvl="1"/>
-            <a:r>
-              <a:rPr lang="en-US" dirty="0"/>
-              <a:t>Can’t guarantee same </a:t>
-            </a:r>
-            <a:r>
-              <a:rPr lang="en-US" dirty="0" smtClean="0"/>
-              <a:t>machine</a:t>
-            </a:r>
-          </a:p>
-          <a:p>
-            <a:pPr lvl="1"/>
-            <a:r>
-              <a:rPr lang="en-US" dirty="0" smtClean="0"/>
-              <a:t>Can use hard drive – but blob is much better</a:t>
-            </a:r>
-            <a:endParaRPr lang="en-US" dirty="0"/>
-          </a:p>
-          <a:p>
-            <a:pPr lvl="1"/>
-            <a:endParaRPr lang="en-US" dirty="0"/>
-          </a:p>
-        </p:txBody>
-      </p:sp>
+      </p:pic>
     </p:spTree>
     <p:extLst>
       <p:ext uri="{BB962C8B-B14F-4D97-AF65-F5344CB8AC3E}">
-        <p14:creationId xmlns:p14="http://schemas.microsoft.com/office/powerpoint/2010/main" val="3707189716"/>
+        <p14:creationId xmlns:p14="http://schemas.microsoft.com/office/powerpoint/2010/main" val="1196570845"/>
       </p:ext>
     </p:extLst>
   </p:cSld>
@@ -7087,6 +7055,181 @@
           <a:p>
             <a:r>
               <a:rPr lang="en-US" dirty="0" smtClean="0"/>
+              <a:t>Functional Architecture</a:t>
+            </a:r>
+            <a:endParaRPr lang="en-US" dirty="0"/>
+          </a:p>
+        </p:txBody>
+      </p:sp>
+      <p:sp>
+        <p:nvSpPr>
+          <p:cNvPr id="3" name="Content Placeholder 2"/>
+          <p:cNvSpPr>
+            <a:spLocks noGrp="1"/>
+          </p:cNvSpPr>
+          <p:nvPr>
+            <p:ph idx="1"/>
+          </p:nvPr>
+        </p:nvSpPr>
+        <p:spPr>
+          <a:xfrm>
+            <a:off x="960699" y="1825625"/>
+            <a:ext cx="10393101" cy="4351338"/>
+          </a:xfrm>
+        </p:spPr>
+        <p:txBody>
+          <a:bodyPr/>
+          <a:lstStyle/>
+          <a:p>
+            <a:r>
+              <a:rPr lang="en-US" dirty="0" smtClean="0"/>
+              <a:t>Microservices</a:t>
+            </a:r>
+          </a:p>
+          <a:p>
+            <a:pPr lvl="1"/>
+            <a:r>
+              <a:rPr lang="en-US" dirty="0" smtClean="0"/>
+              <a:t>Small, Independent Services</a:t>
+            </a:r>
+          </a:p>
+          <a:p>
+            <a:pPr lvl="1"/>
+            <a:r>
+              <a:rPr lang="en-US" dirty="0" smtClean="0"/>
+              <a:t>Independent deployments</a:t>
+            </a:r>
+          </a:p>
+          <a:p>
+            <a:pPr lvl="1"/>
+            <a:r>
+              <a:rPr lang="en-US" dirty="0" smtClean="0"/>
+              <a:t>Versioning is important</a:t>
+            </a:r>
+          </a:p>
+          <a:p>
+            <a:pPr lvl="1"/>
+            <a:r>
+              <a:rPr lang="en-US" dirty="0" smtClean="0"/>
+              <a:t>Async messages among functions,  not </a:t>
+            </a:r>
+            <a:r>
+              <a:rPr lang="en-US" dirty="0" err="1"/>
+              <a:t>S</a:t>
+            </a:r>
+            <a:r>
+              <a:rPr lang="en-US" dirty="0" err="1" smtClean="0"/>
+              <a:t>ych</a:t>
+            </a:r>
+            <a:r>
+              <a:rPr lang="en-US" dirty="0" smtClean="0"/>
+              <a:t> http</a:t>
+            </a:r>
+          </a:p>
+          <a:p>
+            <a:pPr lvl="1"/>
+            <a:endParaRPr lang="en-US" dirty="0"/>
+          </a:p>
+          <a:p>
+            <a:r>
+              <a:rPr lang="en-US" dirty="0" smtClean="0"/>
+              <a:t>Avoid shared state</a:t>
+            </a:r>
+          </a:p>
+          <a:p>
+            <a:pPr lvl="1"/>
+            <a:r>
+              <a:rPr lang="en-US" dirty="0" smtClean="0"/>
+              <a:t>Can store connection manager or </a:t>
+            </a:r>
+            <a:r>
+              <a:rPr lang="en-US" dirty="0" err="1" smtClean="0"/>
+              <a:t>redis</a:t>
+            </a:r>
+            <a:r>
+              <a:rPr lang="en-US" dirty="0" smtClean="0"/>
+              <a:t> cache on a machine</a:t>
+            </a:r>
+          </a:p>
+          <a:p>
+            <a:pPr lvl="1"/>
+            <a:r>
+              <a:rPr lang="en-US" dirty="0"/>
+              <a:t>Can’t guarantee same </a:t>
+            </a:r>
+            <a:r>
+              <a:rPr lang="en-US" dirty="0" smtClean="0"/>
+              <a:t>machine</a:t>
+            </a:r>
+          </a:p>
+          <a:p>
+            <a:pPr lvl="1"/>
+            <a:r>
+              <a:rPr lang="en-US" dirty="0" smtClean="0"/>
+              <a:t>Can use hard drive – but blob is much better</a:t>
+            </a:r>
+            <a:endParaRPr lang="en-US" dirty="0"/>
+          </a:p>
+          <a:p>
+            <a:pPr lvl="1"/>
+            <a:endParaRPr lang="en-US" dirty="0"/>
+          </a:p>
+        </p:txBody>
+      </p:sp>
+    </p:spTree>
+    <p:extLst>
+      <p:ext uri="{BB962C8B-B14F-4D97-AF65-F5344CB8AC3E}">
+        <p14:creationId xmlns:p14="http://schemas.microsoft.com/office/powerpoint/2010/main" val="3707189716"/>
+      </p:ext>
+    </p:extLst>
+  </p:cSld>
+  <p:clrMapOvr>
+    <a:masterClrMapping/>
+  </p:clrMapOvr>
+  <p:timing>
+    <p:tnLst>
+      <p:par>
+        <p:cTn id="1" dur="indefinite" restart="never" nodeType="tmRoot"/>
+      </p:par>
+    </p:tnLst>
+  </p:timing>
+</p:sld>
+</file>
+
+<file path=ppt/slides/slide21.xml><?xml version="1.0" encoding="utf-8"?>
+<p:sld xmlns:a="http://schemas.openxmlformats.org/drawingml/2006/main" xmlns:r="http://schemas.openxmlformats.org/officeDocument/2006/relationships" xmlns:p="http://schemas.openxmlformats.org/presentationml/2006/main">
+  <p:cSld>
+    <p:spTree>
+      <p:nvGrpSpPr>
+        <p:cNvPr id="1" name=""/>
+        <p:cNvGrpSpPr/>
+        <p:nvPr/>
+      </p:nvGrpSpPr>
+      <p:grpSpPr>
+        <a:xfrm>
+          <a:off x="0" y="0"/>
+          <a:ext cx="0" cy="0"/>
+          <a:chOff x="0" y="0"/>
+          <a:chExt cx="0" cy="0"/>
+        </a:xfrm>
+      </p:grpSpPr>
+      <p:sp>
+        <p:nvSpPr>
+          <p:cNvPr id="2" name="Title 1"/>
+          <p:cNvSpPr>
+            <a:spLocks noGrp="1"/>
+          </p:cNvSpPr>
+          <p:nvPr>
+            <p:ph type="title"/>
+          </p:nvPr>
+        </p:nvSpPr>
+        <p:spPr/>
+        <p:txBody>
+          <a:bodyPr/>
+          <a:lstStyle/>
+          <a:p>
+            <a:r>
+              <a:rPr lang="en-US" dirty="0" smtClean="0"/>
               <a:t>Getting Started</a:t>
             </a:r>
             <a:endParaRPr lang="en-US" dirty="0"/>
@@ -7160,7 +7303,7 @@
 </p:sld>
 </file>
 
-<file path=ppt/slides/slide21.xml><?xml version="1.0" encoding="utf-8"?>
+<file path=ppt/slides/slide22.xml><?xml version="1.0" encoding="utf-8"?>
 <p:sld xmlns:a="http://schemas.openxmlformats.org/drawingml/2006/main" xmlns:r="http://schemas.openxmlformats.org/officeDocument/2006/relationships" xmlns:p="http://schemas.openxmlformats.org/presentationml/2006/main">
   <p:cSld>
     <p:spTree>

</xml_diff>

<commit_message>
updated projects.  Added env varaibles
</commit_message>
<xml_diff>
--- a/Presentation/AzureFunctions.pptx
+++ b/Presentation/AzureFunctions.pptx
@@ -221,7 +221,7 @@
           <a:p>
             <a:fld id="{29F7854B-EEF5-4BCE-B982-57195C842F2E}" type="datetimeFigureOut">
               <a:rPr lang="en-US" smtClean="0"/>
-              <a:t>2/5/2017</a:t>
+              <a:t>2/6/2017</a:t>
             </a:fld>
             <a:endParaRPr lang="en-US"/>
           </a:p>
@@ -654,51 +654,20 @@
           <a:p>
             <a:r>
               <a:rPr lang="en-US" baseline="0" dirty="0" smtClean="0"/>
-              <a:t>Every minute, get </a:t>
-            </a:r>
+              <a:t>Every minute, get tweet and put it on the table (C#)</a:t>
+            </a:r>
+          </a:p>
+          <a:p>
             <a:r>
               <a:rPr lang="en-US" baseline="0" dirty="0" smtClean="0"/>
-              <a:t>tweet and </a:t>
-            </a:r>
+              <a:t>Get values from table, analyze it, and put it into a queue (python)</a:t>
+            </a:r>
+          </a:p>
+          <a:p>
             <a:r>
               <a:rPr lang="en-US" baseline="0" dirty="0" smtClean="0"/>
-              <a:t>put it on the </a:t>
-            </a:r>
-            <a:r>
-              <a:rPr lang="en-US" baseline="0" dirty="0" smtClean="0"/>
-              <a:t>table (C#)</a:t>
-            </a:r>
-            <a:endParaRPr lang="en-US" baseline="0" dirty="0" smtClean="0"/>
-          </a:p>
-          <a:p>
-            <a:r>
-              <a:rPr lang="en-US" baseline="0" dirty="0" smtClean="0"/>
-              <a:t>Get values from </a:t>
-            </a:r>
-            <a:r>
-              <a:rPr lang="en-US" baseline="0" dirty="0" smtClean="0"/>
-              <a:t>table, analyze it, </a:t>
-            </a:r>
-            <a:r>
-              <a:rPr lang="en-US" baseline="0" dirty="0" smtClean="0"/>
-              <a:t>and put it into a </a:t>
-            </a:r>
-            <a:r>
-              <a:rPr lang="en-US" baseline="0" dirty="0" smtClean="0"/>
-              <a:t>queue (python)</a:t>
-            </a:r>
-            <a:endParaRPr lang="en-US" baseline="0" dirty="0" smtClean="0"/>
-          </a:p>
-          <a:p>
-            <a:r>
-              <a:rPr lang="en-US" baseline="0" dirty="0" smtClean="0"/>
-              <a:t>Get values from </a:t>
-            </a:r>
-            <a:r>
-              <a:rPr lang="en-US" baseline="0" dirty="0" smtClean="0"/>
-              <a:t>queue and notify (node p.57, 115)</a:t>
-            </a:r>
-            <a:endParaRPr lang="en-US" baseline="0" dirty="0" smtClean="0"/>
+              <a:t>Get values from queue and notify (node p.57, 115)</a:t>
+            </a:r>
           </a:p>
           <a:p>
             <a:r>
@@ -1922,7 +1891,6 @@
               <a:rPr lang="en-US" baseline="0" dirty="0" smtClean="0"/>
               <a:t>Only 4.6 and above</a:t>
             </a:r>
-            <a:endParaRPr lang="en-US" baseline="0" dirty="0" smtClean="0"/>
           </a:p>
         </p:txBody>
       </p:sp>
@@ -2093,7 +2061,7 @@
           <a:p>
             <a:fld id="{D580D8F2-7B30-43DB-963C-CE8585A47115}" type="datetimeFigureOut">
               <a:rPr lang="en-US" smtClean="0"/>
-              <a:t>2/5/2017</a:t>
+              <a:t>2/6/2017</a:t>
             </a:fld>
             <a:endParaRPr lang="en-US"/>
           </a:p>
@@ -2263,7 +2231,7 @@
           <a:p>
             <a:fld id="{D580D8F2-7B30-43DB-963C-CE8585A47115}" type="datetimeFigureOut">
               <a:rPr lang="en-US" smtClean="0"/>
-              <a:t>2/5/2017</a:t>
+              <a:t>2/6/2017</a:t>
             </a:fld>
             <a:endParaRPr lang="en-US"/>
           </a:p>
@@ -2443,7 +2411,7 @@
           <a:p>
             <a:fld id="{D580D8F2-7B30-43DB-963C-CE8585A47115}" type="datetimeFigureOut">
               <a:rPr lang="en-US" smtClean="0"/>
-              <a:t>2/5/2017</a:t>
+              <a:t>2/6/2017</a:t>
             </a:fld>
             <a:endParaRPr lang="en-US"/>
           </a:p>
@@ -2613,7 +2581,7 @@
           <a:p>
             <a:fld id="{D580D8F2-7B30-43DB-963C-CE8585A47115}" type="datetimeFigureOut">
               <a:rPr lang="en-US" smtClean="0"/>
-              <a:t>2/5/2017</a:t>
+              <a:t>2/6/2017</a:t>
             </a:fld>
             <a:endParaRPr lang="en-US"/>
           </a:p>
@@ -2859,7 +2827,7 @@
           <a:p>
             <a:fld id="{D580D8F2-7B30-43DB-963C-CE8585A47115}" type="datetimeFigureOut">
               <a:rPr lang="en-US" smtClean="0"/>
-              <a:t>2/5/2017</a:t>
+              <a:t>2/6/2017</a:t>
             </a:fld>
             <a:endParaRPr lang="en-US"/>
           </a:p>
@@ -3091,7 +3059,7 @@
           <a:p>
             <a:fld id="{D580D8F2-7B30-43DB-963C-CE8585A47115}" type="datetimeFigureOut">
               <a:rPr lang="en-US" smtClean="0"/>
-              <a:t>2/5/2017</a:t>
+              <a:t>2/6/2017</a:t>
             </a:fld>
             <a:endParaRPr lang="en-US"/>
           </a:p>
@@ -3458,7 +3426,7 @@
           <a:p>
             <a:fld id="{D580D8F2-7B30-43DB-963C-CE8585A47115}" type="datetimeFigureOut">
               <a:rPr lang="en-US" smtClean="0"/>
-              <a:t>2/5/2017</a:t>
+              <a:t>2/6/2017</a:t>
             </a:fld>
             <a:endParaRPr lang="en-US"/>
           </a:p>
@@ -3576,7 +3544,7 @@
           <a:p>
             <a:fld id="{D580D8F2-7B30-43DB-963C-CE8585A47115}" type="datetimeFigureOut">
               <a:rPr lang="en-US" smtClean="0"/>
-              <a:t>2/5/2017</a:t>
+              <a:t>2/6/2017</a:t>
             </a:fld>
             <a:endParaRPr lang="en-US"/>
           </a:p>
@@ -3671,7 +3639,7 @@
           <a:p>
             <a:fld id="{D580D8F2-7B30-43DB-963C-CE8585A47115}" type="datetimeFigureOut">
               <a:rPr lang="en-US" smtClean="0"/>
-              <a:t>2/5/2017</a:t>
+              <a:t>2/6/2017</a:t>
             </a:fld>
             <a:endParaRPr lang="en-US"/>
           </a:p>
@@ -3948,7 +3916,7 @@
           <a:p>
             <a:fld id="{D580D8F2-7B30-43DB-963C-CE8585A47115}" type="datetimeFigureOut">
               <a:rPr lang="en-US" smtClean="0"/>
-              <a:t>2/5/2017</a:t>
+              <a:t>2/6/2017</a:t>
             </a:fld>
             <a:endParaRPr lang="en-US"/>
           </a:p>
@@ -4201,7 +4169,7 @@
           <a:p>
             <a:fld id="{D580D8F2-7B30-43DB-963C-CE8585A47115}" type="datetimeFigureOut">
               <a:rPr lang="en-US" smtClean="0"/>
-              <a:t>2/5/2017</a:t>
+              <a:t>2/6/2017</a:t>
             </a:fld>
             <a:endParaRPr lang="en-US"/>
           </a:p>
@@ -4414,7 +4382,7 @@
           <a:p>
             <a:fld id="{D580D8F2-7B30-43DB-963C-CE8585A47115}" type="datetimeFigureOut">
               <a:rPr lang="en-US" smtClean="0"/>
-              <a:t>2/5/2017</a:t>
+              <a:t>2/6/2017</a:t>
             </a:fld>
             <a:endParaRPr lang="en-US"/>
           </a:p>
@@ -6098,7 +6066,7 @@
         <p:spPr>
           <a:xfrm>
             <a:off x="4385967" y="2934390"/>
-            <a:ext cx="1413163" cy="1097280"/>
+            <a:ext cx="1503603" cy="1097280"/>
           </a:xfrm>
           <a:prstGeom prst="rect">
             <a:avLst/>
@@ -6127,7 +6095,7 @@
             <a:pPr algn="ctr"/>
             <a:r>
               <a:rPr lang="en-US" dirty="0" smtClean="0"/>
-              <a:t>Table Trigger</a:t>
+              <a:t>Queue Trigger</a:t>
             </a:r>
             <a:endParaRPr lang="en-US" dirty="0"/>
           </a:p>
@@ -6141,11 +6109,221 @@
         </p:nvSpPr>
         <p:spPr>
           <a:xfrm>
-            <a:off x="6319675" y="1740563"/>
+            <a:off x="2645587" y="2969885"/>
             <a:ext cx="1130531" cy="1014153"/>
           </a:xfrm>
           <a:prstGeom prst="flowChartMagneticDisk">
             <a:avLst/>
+          </a:prstGeom>
+        </p:spPr>
+        <p:style>
+          <a:lnRef idx="3">
+            <a:schemeClr val="lt1"/>
+          </a:lnRef>
+          <a:fillRef idx="1">
+            <a:schemeClr val="accent2"/>
+          </a:fillRef>
+          <a:effectRef idx="1">
+            <a:schemeClr val="accent2"/>
+          </a:effectRef>
+          <a:fontRef idx="minor">
+            <a:schemeClr val="lt1"/>
+          </a:fontRef>
+        </p:style>
+        <p:txBody>
+          <a:bodyPr rtlCol="0" anchor="ctr"/>
+          <a:lstStyle/>
+          <a:p>
+            <a:pPr algn="ctr"/>
+            <a:endParaRPr lang="en-US" dirty="0"/>
+          </a:p>
+        </p:txBody>
+      </p:sp>
+      <p:sp>
+        <p:nvSpPr>
+          <p:cNvPr id="36" name="Flowchart: Direct Access Storage 35"/>
+          <p:cNvSpPr/>
+          <p:nvPr/>
+        </p:nvSpPr>
+        <p:spPr>
+          <a:xfrm>
+            <a:off x="6366857" y="1690688"/>
+            <a:ext cx="947650" cy="1014153"/>
+          </a:xfrm>
+          <a:prstGeom prst="flowChartMagneticDrum">
+            <a:avLst/>
+          </a:prstGeom>
+        </p:spPr>
+        <p:style>
+          <a:lnRef idx="3">
+            <a:schemeClr val="lt1"/>
+          </a:lnRef>
+          <a:fillRef idx="1">
+            <a:schemeClr val="accent4"/>
+          </a:fillRef>
+          <a:effectRef idx="1">
+            <a:schemeClr val="accent4"/>
+          </a:effectRef>
+          <a:fontRef idx="minor">
+            <a:schemeClr val="lt1"/>
+          </a:fontRef>
+        </p:style>
+        <p:txBody>
+          <a:bodyPr rtlCol="0" anchor="ctr"/>
+          <a:lstStyle/>
+          <a:p>
+            <a:pPr algn="ctr"/>
+            <a:endParaRPr lang="en-US" dirty="0"/>
+          </a:p>
+        </p:txBody>
+      </p:sp>
+      <p:sp>
+        <p:nvSpPr>
+          <p:cNvPr id="37" name="Rectangle 36"/>
+          <p:cNvSpPr/>
+          <p:nvPr/>
+        </p:nvSpPr>
+        <p:spPr>
+          <a:xfrm>
+            <a:off x="7709193" y="3017517"/>
+            <a:ext cx="1650770" cy="1097280"/>
+          </a:xfrm>
+          <a:prstGeom prst="rect">
+            <a:avLst/>
+          </a:prstGeom>
+        </p:spPr>
+        <p:style>
+          <a:lnRef idx="2">
+            <a:schemeClr val="accent1">
+              <a:shade val="50000"/>
+            </a:schemeClr>
+          </a:lnRef>
+          <a:fillRef idx="1">
+            <a:schemeClr val="accent1"/>
+          </a:fillRef>
+          <a:effectRef idx="0">
+            <a:schemeClr val="accent1"/>
+          </a:effectRef>
+          <a:fontRef idx="minor">
+            <a:schemeClr val="lt1"/>
+          </a:fontRef>
+        </p:style>
+        <p:txBody>
+          <a:bodyPr rtlCol="0" anchor="ctr"/>
+          <a:lstStyle/>
+          <a:p>
+            <a:pPr algn="ctr"/>
+            <a:r>
+              <a:rPr lang="en-US" dirty="0" smtClean="0"/>
+              <a:t>Table Trigger</a:t>
+            </a:r>
+            <a:endParaRPr lang="en-US" dirty="0"/>
+          </a:p>
+        </p:txBody>
+      </p:sp>
+      <p:sp>
+        <p:nvSpPr>
+          <p:cNvPr id="39" name="Flowchart: Document 38"/>
+          <p:cNvSpPr/>
+          <p:nvPr/>
+        </p:nvSpPr>
+        <p:spPr>
+          <a:xfrm>
+            <a:off x="7516610" y="4984423"/>
+            <a:ext cx="1379913" cy="1097280"/>
+          </a:xfrm>
+          <a:prstGeom prst="flowChartDocument">
+            <a:avLst/>
+          </a:prstGeom>
+        </p:spPr>
+        <p:style>
+          <a:lnRef idx="1">
+            <a:schemeClr val="dk1"/>
+          </a:lnRef>
+          <a:fillRef idx="3">
+            <a:schemeClr val="dk1"/>
+          </a:fillRef>
+          <a:effectRef idx="2">
+            <a:schemeClr val="dk1"/>
+          </a:effectRef>
+          <a:fontRef idx="minor">
+            <a:schemeClr val="lt1"/>
+          </a:fontRef>
+        </p:style>
+        <p:txBody>
+          <a:bodyPr rtlCol="0" anchor="ctr"/>
+          <a:lstStyle/>
+          <a:p>
+            <a:pPr algn="ctr"/>
+            <a:r>
+              <a:rPr lang="en-US" dirty="0" smtClean="0"/>
+              <a:t>Web Page</a:t>
+            </a:r>
+            <a:endParaRPr lang="en-US" dirty="0"/>
+          </a:p>
+        </p:txBody>
+      </p:sp>
+      <p:sp>
+        <p:nvSpPr>
+          <p:cNvPr id="41" name="Circular Arrow 40"/>
+          <p:cNvSpPr/>
+          <p:nvPr/>
+        </p:nvSpPr>
+        <p:spPr>
+          <a:xfrm>
+            <a:off x="1142210" y="1690688"/>
+            <a:ext cx="2133005" cy="2128058"/>
+          </a:xfrm>
+          <a:prstGeom prst="circularArrow">
+            <a:avLst/>
+          </a:prstGeom>
+        </p:spPr>
+        <p:style>
+          <a:lnRef idx="1">
+            <a:schemeClr val="accent2"/>
+          </a:lnRef>
+          <a:fillRef idx="3">
+            <a:schemeClr val="accent2"/>
+          </a:fillRef>
+          <a:effectRef idx="2">
+            <a:schemeClr val="accent2"/>
+          </a:effectRef>
+          <a:fontRef idx="minor">
+            <a:schemeClr val="lt1"/>
+          </a:fontRef>
+        </p:style>
+        <p:txBody>
+          <a:bodyPr rtlCol="0" anchor="ctr"/>
+          <a:lstStyle/>
+          <a:p>
+            <a:pPr algn="ctr"/>
+            <a:endParaRPr lang="en-US">
+              <a:solidFill>
+                <a:schemeClr val="tx1"/>
+              </a:solidFill>
+            </a:endParaRPr>
+          </a:p>
+        </p:txBody>
+      </p:sp>
+      <p:sp>
+        <p:nvSpPr>
+          <p:cNvPr id="42" name="Circular Arrow 41"/>
+          <p:cNvSpPr/>
+          <p:nvPr/>
+        </p:nvSpPr>
+        <p:spPr>
+          <a:xfrm rot="10800000" flipH="1">
+            <a:off x="3166270" y="3230441"/>
+            <a:ext cx="1854617" cy="2128058"/>
+          </a:xfrm>
+          <a:prstGeom prst="circularArrow">
+            <a:avLst>
+              <a:gd name="adj1" fmla="val 12500"/>
+              <a:gd name="adj2" fmla="val 1098330"/>
+              <a:gd name="adj3" fmla="val 20457681"/>
+              <a:gd name="adj4" fmla="val 10800000"/>
+              <a:gd name="adj5" fmla="val 12500"/>
+            </a:avLst>
           </a:prstGeom>
         </p:spPr>
         <p:style>
@@ -6169,26 +6347,26 @@
           <a:lstStyle/>
           <a:p>
             <a:pPr algn="ctr"/>
-            <a:r>
-              <a:rPr lang="en-US" dirty="0" smtClean="0"/>
-              <a:t>Pending</a:t>
-            </a:r>
-            <a:endParaRPr lang="en-US" dirty="0"/>
-          </a:p>
-        </p:txBody>
-      </p:sp>
-      <p:sp>
-        <p:nvSpPr>
-          <p:cNvPr id="36" name="Flowchart: Direct Access Storage 35"/>
+            <a:endParaRPr lang="en-US">
+              <a:solidFill>
+                <a:schemeClr val="tx1"/>
+              </a:solidFill>
+            </a:endParaRPr>
+          </a:p>
+        </p:txBody>
+      </p:sp>
+      <p:sp>
+        <p:nvSpPr>
+          <p:cNvPr id="44" name="Bent Arrow 43"/>
           <p:cNvSpPr/>
           <p:nvPr/>
         </p:nvSpPr>
         <p:spPr>
           <a:xfrm>
-            <a:off x="2664299" y="3000891"/>
-            <a:ext cx="947650" cy="1014153"/>
-          </a:xfrm>
-          <a:prstGeom prst="flowChartMagneticDrum">
+            <a:off x="5218223" y="2047176"/>
+            <a:ext cx="1052745" cy="786505"/>
+          </a:xfrm>
+          <a:prstGeom prst="bentArrow">
             <a:avLst/>
           </a:prstGeom>
         </p:spPr>
@@ -6197,9 +6375,53 @@
             <a:schemeClr val="lt1"/>
           </a:lnRef>
           <a:fillRef idx="1">
+            <a:schemeClr val="accent4"/>
+          </a:fillRef>
+          <a:effectRef idx="1">
+            <a:schemeClr val="accent4"/>
+          </a:effectRef>
+          <a:fontRef idx="minor">
+            <a:schemeClr val="lt1"/>
+          </a:fontRef>
+        </p:style>
+        <p:txBody>
+          <a:bodyPr rtlCol="0" anchor="ctr"/>
+          <a:lstStyle/>
+          <a:p>
+            <a:pPr algn="ctr"/>
+            <a:endParaRPr lang="en-US">
+              <a:solidFill>
+                <a:schemeClr val="tx1"/>
+              </a:solidFill>
+            </a:endParaRPr>
+          </a:p>
+        </p:txBody>
+      </p:sp>
+      <p:sp>
+        <p:nvSpPr>
+          <p:cNvPr id="46" name="Bent Arrow 45"/>
+          <p:cNvSpPr/>
+          <p:nvPr/>
+        </p:nvSpPr>
+        <p:spPr>
+          <a:xfrm rot="5400000">
+            <a:off x="7632528" y="1920726"/>
+            <a:ext cx="797038" cy="1028873"/>
+          </a:xfrm>
+          <a:prstGeom prst="bentArrow">
+            <a:avLst/>
+          </a:prstGeom>
+        </p:spPr>
+        <p:style>
+          <a:lnRef idx="2">
+            <a:schemeClr val="accent6">
+              <a:shade val="50000"/>
+            </a:schemeClr>
+          </a:lnRef>
+          <a:fillRef idx="1">
             <a:schemeClr val="accent6"/>
           </a:fillRef>
-          <a:effectRef idx="1">
+          <a:effectRef idx="0">
             <a:schemeClr val="accent6"/>
           </a:effectRef>
           <a:fontRef idx="minor">
@@ -6211,19 +6433,145 @@
           <a:lstStyle/>
           <a:p>
             <a:pPr algn="ctr"/>
-            <a:endParaRPr lang="en-US" dirty="0"/>
-          </a:p>
-        </p:txBody>
-      </p:sp>
-      <p:sp>
-        <p:nvSpPr>
-          <p:cNvPr id="37" name="Rectangle 36"/>
+            <a:endParaRPr lang="en-US">
+              <a:solidFill>
+                <a:schemeClr val="tx1"/>
+              </a:solidFill>
+            </a:endParaRPr>
+          </a:p>
+        </p:txBody>
+      </p:sp>
+      <p:sp>
+        <p:nvSpPr>
+          <p:cNvPr id="47" name="Right Arrow 46"/>
           <p:cNvSpPr/>
           <p:nvPr/>
         </p:nvSpPr>
         <p:spPr>
+          <a:xfrm rot="10800000">
+            <a:off x="9005974" y="5147473"/>
+            <a:ext cx="548808" cy="588305"/>
+          </a:xfrm>
+          <a:prstGeom prst="rightArrow">
+            <a:avLst/>
+          </a:prstGeom>
+        </p:spPr>
+        <p:style>
+          <a:lnRef idx="2">
+            <a:schemeClr val="dk1">
+              <a:shade val="50000"/>
+            </a:schemeClr>
+          </a:lnRef>
+          <a:fillRef idx="1">
+            <a:schemeClr val="dk1"/>
+          </a:fillRef>
+          <a:effectRef idx="0">
+            <a:schemeClr val="dk1"/>
+          </a:effectRef>
+          <a:fontRef idx="minor">
+            <a:schemeClr val="lt1"/>
+          </a:fontRef>
+        </p:style>
+        <p:txBody>
+          <a:bodyPr rtlCol="0" anchor="ctr"/>
+          <a:lstStyle/>
+          <a:p>
+            <a:pPr algn="ctr"/>
+            <a:endParaRPr lang="en-US"/>
+          </a:p>
+        </p:txBody>
+      </p:sp>
+      <p:sp>
+        <p:nvSpPr>
+          <p:cNvPr id="49" name="Cloud Callout 48"/>
+          <p:cNvSpPr/>
+          <p:nvPr/>
+        </p:nvSpPr>
+        <p:spPr>
           <a:xfrm>
-            <a:off x="7709193" y="3017517"/>
+            <a:off x="443941" y="5370963"/>
+            <a:ext cx="1396538" cy="887570"/>
+          </a:xfrm>
+          <a:prstGeom prst="cloudCallout">
+            <a:avLst/>
+          </a:prstGeom>
+        </p:spPr>
+        <p:style>
+          <a:lnRef idx="3">
+            <a:schemeClr val="lt1"/>
+          </a:lnRef>
+          <a:fillRef idx="1">
+            <a:schemeClr val="accent3"/>
+          </a:fillRef>
+          <a:effectRef idx="1">
+            <a:schemeClr val="accent3"/>
+          </a:effectRef>
+          <a:fontRef idx="minor">
+            <a:schemeClr val="lt1"/>
+          </a:fontRef>
+        </p:style>
+        <p:txBody>
+          <a:bodyPr rtlCol="0" anchor="ctr"/>
+          <a:lstStyle/>
+          <a:p>
+            <a:pPr algn="ctr"/>
+            <a:r>
+              <a:rPr lang="en-US" dirty="0" smtClean="0"/>
+              <a:t>Twitter</a:t>
+            </a:r>
+            <a:endParaRPr lang="en-US" dirty="0"/>
+          </a:p>
+        </p:txBody>
+      </p:sp>
+      <p:sp>
+        <p:nvSpPr>
+          <p:cNvPr id="50" name="Right Arrow 49"/>
+          <p:cNvSpPr/>
+          <p:nvPr/>
+        </p:nvSpPr>
+        <p:spPr>
+          <a:xfrm rot="16200000">
+            <a:off x="684606" y="4481546"/>
+            <a:ext cx="964359" cy="588305"/>
+          </a:xfrm>
+          <a:prstGeom prst="rightArrow">
+            <a:avLst/>
+          </a:prstGeom>
+        </p:spPr>
+        <p:style>
+          <a:lnRef idx="2">
+            <a:schemeClr val="accent3">
+              <a:shade val="50000"/>
+            </a:schemeClr>
+          </a:lnRef>
+          <a:fillRef idx="1">
+            <a:schemeClr val="accent3"/>
+          </a:fillRef>
+          <a:effectRef idx="0">
+            <a:schemeClr val="accent3"/>
+          </a:effectRef>
+          <a:fontRef idx="minor">
+            <a:schemeClr val="lt1"/>
+          </a:fontRef>
+        </p:style>
+        <p:txBody>
+          <a:bodyPr rtlCol="0" anchor="ctr"/>
+          <a:lstStyle/>
+          <a:p>
+            <a:pPr algn="ctr"/>
+            <a:endParaRPr lang="en-US"/>
+          </a:p>
+        </p:txBody>
+      </p:sp>
+      <p:sp>
+        <p:nvSpPr>
+          <p:cNvPr id="16" name="Rectangle 15"/>
+          <p:cNvSpPr/>
+          <p:nvPr/>
+        </p:nvSpPr>
+        <p:spPr>
+          <a:xfrm>
+            <a:off x="9683784" y="4892986"/>
             <a:ext cx="1650770" cy="1097280"/>
           </a:xfrm>
           <a:prstGeom prst="rect">
@@ -6253,7 +6601,7 @@
             <a:pPr algn="ctr"/>
             <a:r>
               <a:rPr lang="en-US" dirty="0" smtClean="0"/>
-              <a:t>Queue Trigger</a:t>
+              <a:t>HTTP GET</a:t>
             </a:r>
             <a:endParaRPr lang="en-US" dirty="0"/>
           </a:p>
@@ -6261,152 +6609,16 @@
       </p:sp>
       <p:sp>
         <p:nvSpPr>
-          <p:cNvPr id="39" name="Flowchart: Document 38"/>
+          <p:cNvPr id="19" name="Circular Arrow 18"/>
           <p:cNvSpPr/>
           <p:nvPr/>
         </p:nvSpPr>
         <p:spPr>
           <a:xfrm>
-            <a:off x="10108276" y="3059077"/>
-            <a:ext cx="1379913" cy="1097280"/>
-          </a:xfrm>
-          <a:prstGeom prst="flowChartDocument">
-            <a:avLst/>
-          </a:prstGeom>
-        </p:spPr>
-        <p:style>
-          <a:lnRef idx="1">
-            <a:schemeClr val="dk1"/>
-          </a:lnRef>
-          <a:fillRef idx="3">
-            <a:schemeClr val="dk1"/>
-          </a:fillRef>
-          <a:effectRef idx="2">
-            <a:schemeClr val="dk1"/>
-          </a:effectRef>
-          <a:fontRef idx="minor">
-            <a:schemeClr val="lt1"/>
-          </a:fontRef>
-        </p:style>
-        <p:txBody>
-          <a:bodyPr rtlCol="0" anchor="ctr"/>
-          <a:lstStyle/>
-          <a:p>
-            <a:pPr algn="ctr"/>
-            <a:r>
-              <a:rPr lang="en-US" dirty="0" smtClean="0"/>
-              <a:t>Text</a:t>
-            </a:r>
-            <a:endParaRPr lang="en-US" dirty="0"/>
-          </a:p>
-        </p:txBody>
-      </p:sp>
-      <p:sp>
-        <p:nvSpPr>
-          <p:cNvPr id="41" name="Circular Arrow 40"/>
-          <p:cNvSpPr/>
-          <p:nvPr/>
-        </p:nvSpPr>
-        <p:spPr>
-          <a:xfrm>
-            <a:off x="1142210" y="1690688"/>
-            <a:ext cx="2133005" cy="2128058"/>
+            <a:off x="8704211" y="1785288"/>
+            <a:ext cx="1981093" cy="1970164"/>
           </a:xfrm>
           <a:prstGeom prst="circularArrow">
-            <a:avLst/>
-          </a:prstGeom>
-        </p:spPr>
-        <p:style>
-          <a:lnRef idx="2">
-            <a:schemeClr val="accent1">
-              <a:shade val="50000"/>
-            </a:schemeClr>
-          </a:lnRef>
-          <a:fillRef idx="1">
-            <a:schemeClr val="accent1"/>
-          </a:fillRef>
-          <a:effectRef idx="0">
-            <a:schemeClr val="accent1"/>
-          </a:effectRef>
-          <a:fontRef idx="minor">
-            <a:schemeClr val="lt1"/>
-          </a:fontRef>
-        </p:style>
-        <p:txBody>
-          <a:bodyPr rtlCol="0" anchor="ctr"/>
-          <a:lstStyle/>
-          <a:p>
-            <a:pPr algn="ctr"/>
-            <a:endParaRPr lang="en-US">
-              <a:solidFill>
-                <a:schemeClr val="tx1"/>
-              </a:solidFill>
-            </a:endParaRPr>
-          </a:p>
-        </p:txBody>
-      </p:sp>
-      <p:sp>
-        <p:nvSpPr>
-          <p:cNvPr id="42" name="Circular Arrow 41"/>
-          <p:cNvSpPr/>
-          <p:nvPr/>
-        </p:nvSpPr>
-        <p:spPr>
-          <a:xfrm rot="10800000" flipH="1">
-            <a:off x="3166270" y="3230441"/>
-            <a:ext cx="1854617" cy="2128058"/>
-          </a:xfrm>
-          <a:prstGeom prst="circularArrow">
-            <a:avLst>
-              <a:gd name="adj1" fmla="val 12500"/>
-              <a:gd name="adj2" fmla="val 1098330"/>
-              <a:gd name="adj3" fmla="val 20457681"/>
-              <a:gd name="adj4" fmla="val 10800000"/>
-              <a:gd name="adj5" fmla="val 12500"/>
-            </a:avLst>
-          </a:prstGeom>
-        </p:spPr>
-        <p:style>
-          <a:lnRef idx="2">
-            <a:schemeClr val="accent4">
-              <a:shade val="50000"/>
-            </a:schemeClr>
-          </a:lnRef>
-          <a:fillRef idx="1">
-            <a:schemeClr val="accent4"/>
-          </a:fillRef>
-          <a:effectRef idx="0">
-            <a:schemeClr val="accent4"/>
-          </a:effectRef>
-          <a:fontRef idx="minor">
-            <a:schemeClr val="lt1"/>
-          </a:fontRef>
-        </p:style>
-        <p:txBody>
-          <a:bodyPr rtlCol="0" anchor="ctr"/>
-          <a:lstStyle/>
-          <a:p>
-            <a:pPr algn="ctr"/>
-            <a:endParaRPr lang="en-US">
-              <a:solidFill>
-                <a:schemeClr val="tx1"/>
-              </a:solidFill>
-            </a:endParaRPr>
-          </a:p>
-        </p:txBody>
-      </p:sp>
-      <p:sp>
-        <p:nvSpPr>
-          <p:cNvPr id="44" name="Bent Arrow 43"/>
-          <p:cNvSpPr/>
-          <p:nvPr/>
-        </p:nvSpPr>
-        <p:spPr>
-          <a:xfrm>
-            <a:off x="5218223" y="2047176"/>
-            <a:ext cx="1052745" cy="786505"/>
-          </a:xfrm>
-          <a:prstGeom prst="bentArrow">
             <a:avLst/>
           </a:prstGeom>
         </p:spPr>
@@ -6441,16 +6653,16 @@
       </p:sp>
       <p:sp>
         <p:nvSpPr>
-          <p:cNvPr id="46" name="Bent Arrow 45"/>
+          <p:cNvPr id="5" name="Down Arrow 4"/>
           <p:cNvSpPr/>
           <p:nvPr/>
         </p:nvSpPr>
         <p:spPr>
-          <a:xfrm rot="5400000">
-            <a:off x="7790054" y="1763200"/>
-            <a:ext cx="847843" cy="1394729"/>
-          </a:xfrm>
-          <a:prstGeom prst="bentArrow">
+          <a:xfrm>
+            <a:off x="10238620" y="4160511"/>
+            <a:ext cx="448887" cy="615187"/>
+          </a:xfrm>
+          <a:prstGeom prst="downArrow">
             <a:avLst/>
           </a:prstGeom>
         </p:spPr>
@@ -6475,40 +6687,37 @@
           <a:lstStyle/>
           <a:p>
             <a:pPr algn="ctr"/>
-            <a:endParaRPr lang="en-US">
-              <a:solidFill>
-                <a:schemeClr val="tx1"/>
-              </a:solidFill>
-            </a:endParaRPr>
-          </a:p>
-        </p:txBody>
-      </p:sp>
-      <p:sp>
-        <p:nvSpPr>
-          <p:cNvPr id="47" name="Right Arrow 46"/>
+            <a:endParaRPr lang="en-US"/>
+          </a:p>
+        </p:txBody>
+      </p:sp>
+      <p:sp>
+        <p:nvSpPr>
+          <p:cNvPr id="20" name="Flowchart: Direct Access Storage 19"/>
           <p:cNvSpPr/>
           <p:nvPr/>
         </p:nvSpPr>
         <p:spPr>
           <a:xfrm>
-            <a:off x="9459715" y="3313564"/>
-            <a:ext cx="548808" cy="588305"/>
-          </a:xfrm>
-          <a:prstGeom prst="rightArrow">
+            <a:off x="9935188" y="2835899"/>
+            <a:ext cx="947650" cy="1014153"/>
+          </a:xfrm>
+          <a:prstGeom prst="flowChartMagneticDrum">
             <a:avLst/>
           </a:prstGeom>
+          <a:solidFill>
+            <a:schemeClr val="accent6"/>
+          </a:solidFill>
         </p:spPr>
         <p:style>
-          <a:lnRef idx="2">
-            <a:schemeClr val="dk1">
-              <a:shade val="50000"/>
-            </a:schemeClr>
+          <a:lnRef idx="3">
+            <a:schemeClr val="lt1"/>
           </a:lnRef>
           <a:fillRef idx="1">
-            <a:schemeClr val="dk1"/>
+            <a:schemeClr val="accent4"/>
           </a:fillRef>
-          <a:effectRef idx="0">
-            <a:schemeClr val="dk1"/>
+          <a:effectRef idx="1">
+            <a:schemeClr val="accent4"/>
           </a:effectRef>
           <a:fontRef idx="minor">
             <a:schemeClr val="lt1"/>
@@ -6519,89 +6728,7 @@
           <a:lstStyle/>
           <a:p>
             <a:pPr algn="ctr"/>
-            <a:endParaRPr lang="en-US"/>
-          </a:p>
-        </p:txBody>
-      </p:sp>
-      <p:sp>
-        <p:nvSpPr>
-          <p:cNvPr id="49" name="Cloud Callout 48"/>
-          <p:cNvSpPr/>
-          <p:nvPr/>
-        </p:nvSpPr>
-        <p:spPr>
-          <a:xfrm>
-            <a:off x="443941" y="5370963"/>
-            <a:ext cx="1396538" cy="887570"/>
-          </a:xfrm>
-          <a:prstGeom prst="cloudCallout">
-            <a:avLst/>
-          </a:prstGeom>
-        </p:spPr>
-        <p:style>
-          <a:lnRef idx="3">
-            <a:schemeClr val="lt1"/>
-          </a:lnRef>
-          <a:fillRef idx="1">
-            <a:schemeClr val="accent3"/>
-          </a:fillRef>
-          <a:effectRef idx="1">
-            <a:schemeClr val="accent3"/>
-          </a:effectRef>
-          <a:fontRef idx="minor">
-            <a:schemeClr val="lt1"/>
-          </a:fontRef>
-        </p:style>
-        <p:txBody>
-          <a:bodyPr rtlCol="0" anchor="ctr"/>
-          <a:lstStyle/>
-          <a:p>
-            <a:pPr algn="ctr"/>
-            <a:r>
-              <a:rPr lang="en-US" dirty="0" smtClean="0"/>
-              <a:t>Twitter</a:t>
-            </a:r>
             <a:endParaRPr lang="en-US" dirty="0"/>
-          </a:p>
-        </p:txBody>
-      </p:sp>
-      <p:sp>
-        <p:nvSpPr>
-          <p:cNvPr id="50" name="Right Arrow 49"/>
-          <p:cNvSpPr/>
-          <p:nvPr/>
-        </p:nvSpPr>
-        <p:spPr>
-          <a:xfrm rot="16200000">
-            <a:off x="684606" y="4481546"/>
-            <a:ext cx="964359" cy="588305"/>
-          </a:xfrm>
-          <a:prstGeom prst="rightArrow">
-            <a:avLst/>
-          </a:prstGeom>
-        </p:spPr>
-        <p:style>
-          <a:lnRef idx="2">
-            <a:schemeClr val="accent3">
-              <a:shade val="50000"/>
-            </a:schemeClr>
-          </a:lnRef>
-          <a:fillRef idx="1">
-            <a:schemeClr val="accent3"/>
-          </a:fillRef>
-          <a:effectRef idx="0">
-            <a:schemeClr val="accent3"/>
-          </a:effectRef>
-          <a:fontRef idx="minor">
-            <a:schemeClr val="lt1"/>
-          </a:fontRef>
-        </p:style>
-        <p:txBody>
-          <a:bodyPr rtlCol="0" anchor="ctr"/>
-          <a:lstStyle/>
-          <a:p>
-            <a:pPr algn="ctr"/>
-            <a:endParaRPr lang="en-US"/>
           </a:p>
         </p:txBody>
       </p:sp>

</xml_diff>